<commit_message>
Base de données simplifiée
</commit_message>
<xml_diff>
--- a/ermodel.pptx
+++ b/ermodel.pptx
@@ -5,7 +5,7 @@
     <p:sldMasterId id="2147483648" r:id="rId1"/>
   </p:sldMasterIdLst>
   <p:sldIdLst>
-    <p:sldId id="256" r:id="rId2"/>
+    <p:sldId id="257" r:id="rId2"/>
   </p:sldIdLst>
   <p:sldSz cx="12192000" cy="6858000"/>
   <p:notesSz cx="6858000" cy="9144000"/>
@@ -104,6 +104,11 @@
       </a:defRPr>
     </a:lvl9pPr>
   </p:defaultTextStyle>
+  <p:extLst>
+    <p:ext uri="{EFAFB233-063F-42B5-8137-9DF3F51BA10A}">
+      <p15:sldGuideLst xmlns:p15="http://schemas.microsoft.com/office/powerpoint/2012/main"/>
+    </p:ext>
+  </p:extLst>
 </p:presentation>
 </file>
 
@@ -238,7 +243,7 @@
           <a:p>
             <a:fld id="{8F105699-1909-4BD2-BEC5-C71F1DE99670}" type="datetimeFigureOut">
               <a:rPr lang="en-US" smtClean="0"/>
-              <a:t>12/8/2017</a:t>
+              <a:t>12/16/2017</a:t>
             </a:fld>
             <a:endParaRPr lang="en-US"/>
           </a:p>
@@ -408,7 +413,7 @@
           <a:p>
             <a:fld id="{8F105699-1909-4BD2-BEC5-C71F1DE99670}" type="datetimeFigureOut">
               <a:rPr lang="en-US" smtClean="0"/>
-              <a:t>12/8/2017</a:t>
+              <a:t>12/16/2017</a:t>
             </a:fld>
             <a:endParaRPr lang="en-US"/>
           </a:p>
@@ -588,7 +593,7 @@
           <a:p>
             <a:fld id="{8F105699-1909-4BD2-BEC5-C71F1DE99670}" type="datetimeFigureOut">
               <a:rPr lang="en-US" smtClean="0"/>
-              <a:t>12/8/2017</a:t>
+              <a:t>12/16/2017</a:t>
             </a:fld>
             <a:endParaRPr lang="en-US"/>
           </a:p>
@@ -758,7 +763,7 @@
           <a:p>
             <a:fld id="{8F105699-1909-4BD2-BEC5-C71F1DE99670}" type="datetimeFigureOut">
               <a:rPr lang="en-US" smtClean="0"/>
-              <a:t>12/8/2017</a:t>
+              <a:t>12/16/2017</a:t>
             </a:fld>
             <a:endParaRPr lang="en-US"/>
           </a:p>
@@ -1004,7 +1009,7 @@
           <a:p>
             <a:fld id="{8F105699-1909-4BD2-BEC5-C71F1DE99670}" type="datetimeFigureOut">
               <a:rPr lang="en-US" smtClean="0"/>
-              <a:t>12/8/2017</a:t>
+              <a:t>12/16/2017</a:t>
             </a:fld>
             <a:endParaRPr lang="en-US"/>
           </a:p>
@@ -1236,7 +1241,7 @@
           <a:p>
             <a:fld id="{8F105699-1909-4BD2-BEC5-C71F1DE99670}" type="datetimeFigureOut">
               <a:rPr lang="en-US" smtClean="0"/>
-              <a:t>12/8/2017</a:t>
+              <a:t>12/16/2017</a:t>
             </a:fld>
             <a:endParaRPr lang="en-US"/>
           </a:p>
@@ -1603,7 +1608,7 @@
           <a:p>
             <a:fld id="{8F105699-1909-4BD2-BEC5-C71F1DE99670}" type="datetimeFigureOut">
               <a:rPr lang="en-US" smtClean="0"/>
-              <a:t>12/8/2017</a:t>
+              <a:t>12/16/2017</a:t>
             </a:fld>
             <a:endParaRPr lang="en-US"/>
           </a:p>
@@ -1721,7 +1726,7 @@
           <a:p>
             <a:fld id="{8F105699-1909-4BD2-BEC5-C71F1DE99670}" type="datetimeFigureOut">
               <a:rPr lang="en-US" smtClean="0"/>
-              <a:t>12/8/2017</a:t>
+              <a:t>12/16/2017</a:t>
             </a:fld>
             <a:endParaRPr lang="en-US"/>
           </a:p>
@@ -1816,7 +1821,7 @@
           <a:p>
             <a:fld id="{8F105699-1909-4BD2-BEC5-C71F1DE99670}" type="datetimeFigureOut">
               <a:rPr lang="en-US" smtClean="0"/>
-              <a:t>12/8/2017</a:t>
+              <a:t>12/16/2017</a:t>
             </a:fld>
             <a:endParaRPr lang="en-US"/>
           </a:p>
@@ -2093,7 +2098,7 @@
           <a:p>
             <a:fld id="{8F105699-1909-4BD2-BEC5-C71F1DE99670}" type="datetimeFigureOut">
               <a:rPr lang="en-US" smtClean="0"/>
-              <a:t>12/8/2017</a:t>
+              <a:t>12/16/2017</a:t>
             </a:fld>
             <a:endParaRPr lang="en-US"/>
           </a:p>
@@ -2346,7 +2351,7 @@
           <a:p>
             <a:fld id="{8F105699-1909-4BD2-BEC5-C71F1DE99670}" type="datetimeFigureOut">
               <a:rPr lang="en-US" smtClean="0"/>
-              <a:t>12/8/2017</a:t>
+              <a:t>12/16/2017</a:t>
             </a:fld>
             <a:endParaRPr lang="en-US"/>
           </a:p>
@@ -2559,7 +2564,7 @@
           <a:p>
             <a:fld id="{8F105699-1909-4BD2-BEC5-C71F1DE99670}" type="datetimeFigureOut">
               <a:rPr lang="en-US" smtClean="0"/>
-              <a:t>12/8/2017</a:t>
+              <a:t>12/16/2017</a:t>
             </a:fld>
             <a:endParaRPr lang="en-US"/>
           </a:p>
@@ -3032,41 +3037,6 @@
           </a:p>
         </p:txBody>
       </p:sp>
-      <p:cxnSp>
-        <p:nvCxnSpPr>
-          <p:cNvPr id="5" name="Straight Connector 32"/>
-          <p:cNvCxnSpPr/>
-          <p:nvPr/>
-        </p:nvCxnSpPr>
-        <p:spPr>
-          <a:xfrm flipV="1">
-            <a:off x="5718426" y="2617834"/>
-            <a:ext cx="0" cy="446400"/>
-          </a:xfrm>
-          <a:prstGeom prst="line">
-            <a:avLst/>
-          </a:prstGeom>
-          <a:ln w="25400">
-            <a:solidFill>
-              <a:schemeClr val="tx1"/>
-            </a:solidFill>
-          </a:ln>
-        </p:spPr>
-        <p:style>
-          <a:lnRef idx="1">
-            <a:schemeClr val="accent1"/>
-          </a:lnRef>
-          <a:fillRef idx="0">
-            <a:schemeClr val="accent1"/>
-          </a:fillRef>
-          <a:effectRef idx="0">
-            <a:schemeClr val="accent1"/>
-          </a:effectRef>
-          <a:fontRef idx="minor">
-            <a:schemeClr val="tx1"/>
-          </a:fontRef>
-        </p:style>
-      </p:cxnSp>
       <p:sp>
         <p:nvSpPr>
           <p:cNvPr id="6" name="Oval 62"/>
@@ -9387,80 +9357,6 @@
           </a:p>
         </p:txBody>
       </p:sp>
-      <p:sp>
-        <p:nvSpPr>
-          <p:cNvPr id="101" name="Oval 62"/>
-          <p:cNvSpPr/>
-          <p:nvPr/>
-        </p:nvSpPr>
-        <p:spPr>
-          <a:xfrm>
-            <a:off x="5853183" y="558489"/>
-            <a:ext cx="889000" cy="269875"/>
-          </a:xfrm>
-          <a:prstGeom prst="ellipse">
-            <a:avLst/>
-          </a:prstGeom>
-          <a:noFill/>
-          <a:ln w="12700">
-            <a:solidFill>
-              <a:schemeClr val="tx1"/>
-            </a:solidFill>
-          </a:ln>
-        </p:spPr>
-        <p:style>
-          <a:lnRef idx="2">
-            <a:schemeClr val="accent1">
-              <a:shade val="50000"/>
-            </a:schemeClr>
-          </a:lnRef>
-          <a:fillRef idx="1">
-            <a:schemeClr val="accent1"/>
-          </a:fillRef>
-          <a:effectRef idx="0">
-            <a:schemeClr val="accent1"/>
-          </a:effectRef>
-          <a:fontRef idx="minor">
-            <a:schemeClr val="lt1"/>
-          </a:fontRef>
-        </p:style>
-        <p:txBody>
-          <a:bodyPr wrap="none" lIns="0" tIns="0" rIns="0" bIns="0" anchor="ctr"/>
-          <a:lstStyle/>
-          <a:p>
-            <a:pPr algn="ctr" fontAlgn="auto">
-              <a:spcBef>
-                <a:spcPts val="0"/>
-              </a:spcBef>
-              <a:spcAft>
-                <a:spcPts val="0"/>
-              </a:spcAft>
-              <a:defRPr/>
-            </a:pPr>
-            <a:r>
-              <a:rPr lang="fr-FR" sz="1200" u="sng" dirty="0">
-                <a:solidFill>
-                  <a:schemeClr val="tx1"/>
-                </a:solidFill>
-              </a:rPr>
-              <a:t>n</a:t>
-            </a:r>
-            <a:r>
-              <a:rPr lang="fr-FR" sz="1200" u="sng" dirty="0" smtClean="0">
-                <a:solidFill>
-                  <a:schemeClr val="tx1"/>
-                </a:solidFill>
-              </a:rPr>
-              <a:t>umero</a:t>
-            </a:r>
-            <a:endParaRPr lang="fr-FR" sz="1200" u="sng" dirty="0">
-              <a:solidFill>
-                <a:schemeClr val="tx1"/>
-              </a:solidFill>
-            </a:endParaRPr>
-          </a:p>
-        </p:txBody>
-      </p:sp>
       <p:cxnSp>
         <p:nvCxnSpPr>
           <p:cNvPr id="102" name="Straight Connector 126"/>
@@ -9469,7 +9365,7 @@
         </p:nvCxnSpPr>
         <p:spPr>
           <a:xfrm flipH="1">
-            <a:off x="4699111" y="2103956"/>
+            <a:off x="6016163" y="1083445"/>
             <a:ext cx="104856" cy="113351"/>
           </a:xfrm>
           <a:prstGeom prst="line">
@@ -9496,72 +9392,6 @@
           </a:fontRef>
         </p:style>
       </p:cxnSp>
-      <p:sp>
-        <p:nvSpPr>
-          <p:cNvPr id="103" name="Flowchart: Decision 28"/>
-          <p:cNvSpPr/>
-          <p:nvPr/>
-        </p:nvSpPr>
-        <p:spPr>
-          <a:xfrm>
-            <a:off x="4287350" y="1198443"/>
-            <a:ext cx="683968" cy="338832"/>
-          </a:xfrm>
-          <a:prstGeom prst="flowChartDecision">
-            <a:avLst/>
-          </a:prstGeom>
-          <a:noFill/>
-          <a:ln w="25400" cmpd="sng">
-            <a:solidFill>
-              <a:schemeClr val="tx1"/>
-            </a:solidFill>
-          </a:ln>
-        </p:spPr>
-        <p:style>
-          <a:lnRef idx="2">
-            <a:schemeClr val="accent1">
-              <a:shade val="50000"/>
-            </a:schemeClr>
-          </a:lnRef>
-          <a:fillRef idx="1">
-            <a:schemeClr val="accent1"/>
-          </a:fillRef>
-          <a:effectRef idx="0">
-            <a:schemeClr val="accent1"/>
-          </a:effectRef>
-          <a:fontRef idx="minor">
-            <a:schemeClr val="lt1"/>
-          </a:fontRef>
-        </p:style>
-        <p:txBody>
-          <a:bodyPr wrap="none" lIns="0" tIns="0" rIns="0" bIns="0" anchor="ctr"/>
-          <a:lstStyle/>
-          <a:p>
-            <a:pPr algn="ctr" fontAlgn="auto">
-              <a:spcBef>
-                <a:spcPts val="0"/>
-              </a:spcBef>
-              <a:spcAft>
-                <a:spcPts val="0"/>
-              </a:spcAft>
-              <a:defRPr/>
-            </a:pPr>
-            <a:r>
-              <a:rPr lang="fr-FR" sz="900" dirty="0" smtClean="0">
-                <a:solidFill>
-                  <a:schemeClr val="tx1"/>
-                </a:solidFill>
-              </a:rPr>
-              <a:t>Contient</a:t>
-            </a:r>
-            <a:endParaRPr lang="fr-FR" sz="1400" dirty="0">
-              <a:solidFill>
-                <a:schemeClr val="tx1"/>
-              </a:solidFill>
-            </a:endParaRPr>
-          </a:p>
-        </p:txBody>
-      </p:sp>
       <p:sp>
         <p:nvSpPr>
           <p:cNvPr id="105" name="Rectangle 104"/>
@@ -9733,72 +9563,6 @@
       </p:cxnSp>
       <p:sp>
         <p:nvSpPr>
-          <p:cNvPr id="113" name="Flowchart: Decision 28"/>
-          <p:cNvSpPr/>
-          <p:nvPr/>
-        </p:nvSpPr>
-        <p:spPr>
-          <a:xfrm>
-            <a:off x="5178676" y="2078084"/>
-            <a:ext cx="1079500" cy="539750"/>
-          </a:xfrm>
-          <a:prstGeom prst="flowChartDecision">
-            <a:avLst/>
-          </a:prstGeom>
-          <a:noFill/>
-          <a:ln w="25400" cmpd="sng">
-            <a:solidFill>
-              <a:schemeClr val="tx1"/>
-            </a:solidFill>
-          </a:ln>
-        </p:spPr>
-        <p:style>
-          <a:lnRef idx="2">
-            <a:schemeClr val="accent1">
-              <a:shade val="50000"/>
-            </a:schemeClr>
-          </a:lnRef>
-          <a:fillRef idx="1">
-            <a:schemeClr val="accent1"/>
-          </a:fillRef>
-          <a:effectRef idx="0">
-            <a:schemeClr val="accent1"/>
-          </a:effectRef>
-          <a:fontRef idx="minor">
-            <a:schemeClr val="lt1"/>
-          </a:fontRef>
-        </p:style>
-        <p:txBody>
-          <a:bodyPr wrap="none" lIns="0" tIns="0" rIns="0" bIns="0" anchor="ctr"/>
-          <a:lstStyle/>
-          <a:p>
-            <a:pPr algn="ctr" fontAlgn="auto">
-              <a:spcBef>
-                <a:spcPts val="0"/>
-              </a:spcBef>
-              <a:spcAft>
-                <a:spcPts val="0"/>
-              </a:spcAft>
-              <a:defRPr/>
-            </a:pPr>
-            <a:r>
-              <a:rPr lang="fr-FR" sz="1300" dirty="0" smtClean="0">
-                <a:solidFill>
-                  <a:schemeClr val="tx1"/>
-                </a:solidFill>
-              </a:rPr>
-              <a:t>Parcourt</a:t>
-            </a:r>
-            <a:endParaRPr lang="fr-FR" sz="1300" dirty="0">
-              <a:solidFill>
-                <a:schemeClr val="tx1"/>
-              </a:solidFill>
-            </a:endParaRPr>
-          </a:p>
-        </p:txBody>
-      </p:sp>
-      <p:sp>
-        <p:nvSpPr>
           <p:cNvPr id="114" name="Rectangle 113"/>
           <p:cNvSpPr>
             <a:spLocks noChangeAspect="1"/>
@@ -9865,76 +9629,6 @@
           </a:p>
         </p:txBody>
       </p:sp>
-      <p:cxnSp>
-        <p:nvCxnSpPr>
-          <p:cNvPr id="115" name="Straight Connector 32"/>
-          <p:cNvCxnSpPr/>
-          <p:nvPr/>
-        </p:nvCxnSpPr>
-        <p:spPr>
-          <a:xfrm flipV="1">
-            <a:off x="5718426" y="1635172"/>
-            <a:ext cx="0" cy="446400"/>
-          </a:xfrm>
-          <a:prstGeom prst="line">
-            <a:avLst/>
-          </a:prstGeom>
-          <a:ln w="25400">
-            <a:solidFill>
-              <a:schemeClr val="tx1"/>
-            </a:solidFill>
-          </a:ln>
-        </p:spPr>
-        <p:style>
-          <a:lnRef idx="1">
-            <a:schemeClr val="accent1"/>
-          </a:lnRef>
-          <a:fillRef idx="0">
-            <a:schemeClr val="accent1"/>
-          </a:fillRef>
-          <a:effectRef idx="0">
-            <a:schemeClr val="accent1"/>
-          </a:effectRef>
-          <a:fontRef idx="minor">
-            <a:schemeClr val="tx1"/>
-          </a:fontRef>
-        </p:style>
-      </p:cxnSp>
-      <p:cxnSp>
-        <p:nvCxnSpPr>
-          <p:cNvPr id="116" name="Straight Connector 32"/>
-          <p:cNvCxnSpPr/>
-          <p:nvPr/>
-        </p:nvCxnSpPr>
-        <p:spPr>
-          <a:xfrm flipV="1">
-            <a:off x="5718426" y="2617834"/>
-            <a:ext cx="0" cy="446400"/>
-          </a:xfrm>
-          <a:prstGeom prst="line">
-            <a:avLst/>
-          </a:prstGeom>
-          <a:ln w="25400">
-            <a:solidFill>
-              <a:schemeClr val="tx1"/>
-            </a:solidFill>
-          </a:ln>
-        </p:spPr>
-        <p:style>
-          <a:lnRef idx="1">
-            <a:schemeClr val="accent1"/>
-          </a:lnRef>
-          <a:fillRef idx="0">
-            <a:schemeClr val="accent1"/>
-          </a:fillRef>
-          <a:effectRef idx="0">
-            <a:schemeClr val="accent1"/>
-          </a:effectRef>
-          <a:fontRef idx="minor">
-            <a:schemeClr val="tx1"/>
-          </a:fontRef>
-        </p:style>
-      </p:cxnSp>
       <p:cxnSp>
         <p:nvCxnSpPr>
           <p:cNvPr id="118" name="Straight Connector 126"/>
@@ -11980,388 +11674,6 @@
       </p:sp>
       <p:sp>
         <p:nvSpPr>
-          <p:cNvPr id="168" name="TextBox 10"/>
-          <p:cNvSpPr txBox="1">
-            <a:spLocks noChangeArrowheads="1"/>
-          </p:cNvSpPr>
-          <p:nvPr/>
-        </p:nvSpPr>
-        <p:spPr bwMode="auto">
-          <a:xfrm>
-            <a:off x="5247232" y="1668891"/>
-            <a:ext cx="494046" cy="276999"/>
-          </a:xfrm>
-          <a:prstGeom prst="rect">
-            <a:avLst/>
-          </a:prstGeom>
-          <a:noFill/>
-          <a:ln>
-            <a:noFill/>
-          </a:ln>
-          <a:extLst>
-            <a:ext uri="{909E8E84-426E-40DD-AFC4-6F175D3DCCD1}">
-              <a14:hiddenFill xmlns:a14="http://schemas.microsoft.com/office/drawing/2010/main">
-                <a:solidFill>
-                  <a:srgbClr val="FFFFFF"/>
-                </a:solidFill>
-              </a14:hiddenFill>
-            </a:ext>
-            <a:ext uri="{91240B29-F687-4F45-9708-019B960494DF}">
-              <a14:hiddenLine xmlns:a14="http://schemas.microsoft.com/office/drawing/2010/main" w="9525">
-                <a:solidFill>
-                  <a:srgbClr val="000000"/>
-                </a:solidFill>
-                <a:miter lim="800000"/>
-                <a:headEnd/>
-                <a:tailEnd/>
-              </a14:hiddenLine>
-            </a:ext>
-          </a:extLst>
-        </p:spPr>
-        <p:txBody>
-          <a:bodyPr wrap="none">
-            <a:spAutoFit/>
-          </a:bodyPr>
-          <a:lstStyle>
-            <a:lvl1pPr eaLnBrk="0" hangingPunct="0">
-              <a:spcBef>
-                <a:spcPct val="20000"/>
-              </a:spcBef>
-              <a:buFont typeface="Arial" charset="0"/>
-              <a:buChar char="•"/>
-              <a:defRPr sz="3200">
-                <a:solidFill>
-                  <a:schemeClr val="tx1"/>
-                </a:solidFill>
-                <a:latin typeface="Calibri" pitchFamily="34" charset="0"/>
-              </a:defRPr>
-            </a:lvl1pPr>
-            <a:lvl2pPr marL="742950" indent="-285750" eaLnBrk="0" hangingPunct="0">
-              <a:spcBef>
-                <a:spcPct val="20000"/>
-              </a:spcBef>
-              <a:buFont typeface="Arial" charset="0"/>
-              <a:buChar char="–"/>
-              <a:defRPr sz="2800">
-                <a:solidFill>
-                  <a:schemeClr val="tx1"/>
-                </a:solidFill>
-                <a:latin typeface="Calibri" pitchFamily="34" charset="0"/>
-              </a:defRPr>
-            </a:lvl2pPr>
-            <a:lvl3pPr marL="1143000" indent="-228600" eaLnBrk="0" hangingPunct="0">
-              <a:spcBef>
-                <a:spcPct val="20000"/>
-              </a:spcBef>
-              <a:buFont typeface="Arial" charset="0"/>
-              <a:buChar char="•"/>
-              <a:defRPr sz="2400">
-                <a:solidFill>
-                  <a:schemeClr val="tx1"/>
-                </a:solidFill>
-                <a:latin typeface="Calibri" pitchFamily="34" charset="0"/>
-              </a:defRPr>
-            </a:lvl3pPr>
-            <a:lvl4pPr marL="1600200" indent="-228600" eaLnBrk="0" hangingPunct="0">
-              <a:spcBef>
-                <a:spcPct val="20000"/>
-              </a:spcBef>
-              <a:buFont typeface="Arial" charset="0"/>
-              <a:buChar char="–"/>
-              <a:defRPr sz="2000">
-                <a:solidFill>
-                  <a:schemeClr val="tx1"/>
-                </a:solidFill>
-                <a:latin typeface="Calibri" pitchFamily="34" charset="0"/>
-              </a:defRPr>
-            </a:lvl4pPr>
-            <a:lvl5pPr marL="2057400" indent="-228600" eaLnBrk="0" hangingPunct="0">
-              <a:spcBef>
-                <a:spcPct val="20000"/>
-              </a:spcBef>
-              <a:buFont typeface="Arial" charset="0"/>
-              <a:buChar char="»"/>
-              <a:defRPr sz="2000">
-                <a:solidFill>
-                  <a:schemeClr val="tx1"/>
-                </a:solidFill>
-                <a:latin typeface="Calibri" pitchFamily="34" charset="0"/>
-              </a:defRPr>
-            </a:lvl5pPr>
-            <a:lvl6pPr marL="2514600" indent="-228600" eaLnBrk="0" fontAlgn="base" hangingPunct="0">
-              <a:spcBef>
-                <a:spcPct val="20000"/>
-              </a:spcBef>
-              <a:spcAft>
-                <a:spcPct val="0"/>
-              </a:spcAft>
-              <a:buFont typeface="Arial" charset="0"/>
-              <a:buChar char="»"/>
-              <a:defRPr sz="2000">
-                <a:solidFill>
-                  <a:schemeClr val="tx1"/>
-                </a:solidFill>
-                <a:latin typeface="Calibri" pitchFamily="34" charset="0"/>
-              </a:defRPr>
-            </a:lvl6pPr>
-            <a:lvl7pPr marL="2971800" indent="-228600" eaLnBrk="0" fontAlgn="base" hangingPunct="0">
-              <a:spcBef>
-                <a:spcPct val="20000"/>
-              </a:spcBef>
-              <a:spcAft>
-                <a:spcPct val="0"/>
-              </a:spcAft>
-              <a:buFont typeface="Arial" charset="0"/>
-              <a:buChar char="»"/>
-              <a:defRPr sz="2000">
-                <a:solidFill>
-                  <a:schemeClr val="tx1"/>
-                </a:solidFill>
-                <a:latin typeface="Calibri" pitchFamily="34" charset="0"/>
-              </a:defRPr>
-            </a:lvl7pPr>
-            <a:lvl8pPr marL="3429000" indent="-228600" eaLnBrk="0" fontAlgn="base" hangingPunct="0">
-              <a:spcBef>
-                <a:spcPct val="20000"/>
-              </a:spcBef>
-              <a:spcAft>
-                <a:spcPct val="0"/>
-              </a:spcAft>
-              <a:buFont typeface="Arial" charset="0"/>
-              <a:buChar char="»"/>
-              <a:defRPr sz="2000">
-                <a:solidFill>
-                  <a:schemeClr val="tx1"/>
-                </a:solidFill>
-                <a:latin typeface="Calibri" pitchFamily="34" charset="0"/>
-              </a:defRPr>
-            </a:lvl8pPr>
-            <a:lvl9pPr marL="3886200" indent="-228600" eaLnBrk="0" fontAlgn="base" hangingPunct="0">
-              <a:spcBef>
-                <a:spcPct val="20000"/>
-              </a:spcBef>
-              <a:spcAft>
-                <a:spcPct val="0"/>
-              </a:spcAft>
-              <a:buFont typeface="Arial" charset="0"/>
-              <a:buChar char="»"/>
-              <a:defRPr sz="2000">
-                <a:solidFill>
-                  <a:schemeClr val="tx1"/>
-                </a:solidFill>
-                <a:latin typeface="Calibri" pitchFamily="34" charset="0"/>
-              </a:defRPr>
-            </a:lvl9pPr>
-          </a:lstStyle>
-          <a:p>
-            <a:pPr eaLnBrk="1" hangingPunct="1">
-              <a:spcBef>
-                <a:spcPct val="0"/>
-              </a:spcBef>
-              <a:buFontTx/>
-              <a:buNone/>
-            </a:pPr>
-            <a:r>
-              <a:rPr lang="fr-FR" altLang="fr-FR" sz="1200" dirty="0" smtClean="0"/>
-              <a:t>(0,N)</a:t>
-            </a:r>
-            <a:endParaRPr lang="fr-FR" altLang="fr-FR" sz="1200" dirty="0"/>
-          </a:p>
-        </p:txBody>
-      </p:sp>
-      <p:sp>
-        <p:nvSpPr>
-          <p:cNvPr id="169" name="TextBox 10"/>
-          <p:cNvSpPr txBox="1">
-            <a:spLocks noChangeArrowheads="1"/>
-          </p:cNvSpPr>
-          <p:nvPr/>
-        </p:nvSpPr>
-        <p:spPr bwMode="auto">
-          <a:xfrm>
-            <a:off x="5708112" y="2733701"/>
-            <a:ext cx="473206" cy="276999"/>
-          </a:xfrm>
-          <a:prstGeom prst="rect">
-            <a:avLst/>
-          </a:prstGeom>
-          <a:noFill/>
-          <a:ln>
-            <a:noFill/>
-          </a:ln>
-          <a:extLst>
-            <a:ext uri="{909E8E84-426E-40DD-AFC4-6F175D3DCCD1}">
-              <a14:hiddenFill xmlns:a14="http://schemas.microsoft.com/office/drawing/2010/main">
-                <a:solidFill>
-                  <a:srgbClr val="FFFFFF"/>
-                </a:solidFill>
-              </a14:hiddenFill>
-            </a:ext>
-            <a:ext uri="{91240B29-F687-4F45-9708-019B960494DF}">
-              <a14:hiddenLine xmlns:a14="http://schemas.microsoft.com/office/drawing/2010/main" w="9525">
-                <a:solidFill>
-                  <a:srgbClr val="000000"/>
-                </a:solidFill>
-                <a:miter lim="800000"/>
-                <a:headEnd/>
-                <a:tailEnd/>
-              </a14:hiddenLine>
-            </a:ext>
-          </a:extLst>
-        </p:spPr>
-        <p:txBody>
-          <a:bodyPr wrap="none">
-            <a:spAutoFit/>
-          </a:bodyPr>
-          <a:lstStyle>
-            <a:lvl1pPr eaLnBrk="0" hangingPunct="0">
-              <a:spcBef>
-                <a:spcPct val="20000"/>
-              </a:spcBef>
-              <a:buFont typeface="Arial" charset="0"/>
-              <a:buChar char="•"/>
-              <a:defRPr sz="3200">
-                <a:solidFill>
-                  <a:schemeClr val="tx1"/>
-                </a:solidFill>
-                <a:latin typeface="Calibri" pitchFamily="34" charset="0"/>
-              </a:defRPr>
-            </a:lvl1pPr>
-            <a:lvl2pPr marL="742950" indent="-285750" eaLnBrk="0" hangingPunct="0">
-              <a:spcBef>
-                <a:spcPct val="20000"/>
-              </a:spcBef>
-              <a:buFont typeface="Arial" charset="0"/>
-              <a:buChar char="–"/>
-              <a:defRPr sz="2800">
-                <a:solidFill>
-                  <a:schemeClr val="tx1"/>
-                </a:solidFill>
-                <a:latin typeface="Calibri" pitchFamily="34" charset="0"/>
-              </a:defRPr>
-            </a:lvl2pPr>
-            <a:lvl3pPr marL="1143000" indent="-228600" eaLnBrk="0" hangingPunct="0">
-              <a:spcBef>
-                <a:spcPct val="20000"/>
-              </a:spcBef>
-              <a:buFont typeface="Arial" charset="0"/>
-              <a:buChar char="•"/>
-              <a:defRPr sz="2400">
-                <a:solidFill>
-                  <a:schemeClr val="tx1"/>
-                </a:solidFill>
-                <a:latin typeface="Calibri" pitchFamily="34" charset="0"/>
-              </a:defRPr>
-            </a:lvl3pPr>
-            <a:lvl4pPr marL="1600200" indent="-228600" eaLnBrk="0" hangingPunct="0">
-              <a:spcBef>
-                <a:spcPct val="20000"/>
-              </a:spcBef>
-              <a:buFont typeface="Arial" charset="0"/>
-              <a:buChar char="–"/>
-              <a:defRPr sz="2000">
-                <a:solidFill>
-                  <a:schemeClr val="tx1"/>
-                </a:solidFill>
-                <a:latin typeface="Calibri" pitchFamily="34" charset="0"/>
-              </a:defRPr>
-            </a:lvl4pPr>
-            <a:lvl5pPr marL="2057400" indent="-228600" eaLnBrk="0" hangingPunct="0">
-              <a:spcBef>
-                <a:spcPct val="20000"/>
-              </a:spcBef>
-              <a:buFont typeface="Arial" charset="0"/>
-              <a:buChar char="»"/>
-              <a:defRPr sz="2000">
-                <a:solidFill>
-                  <a:schemeClr val="tx1"/>
-                </a:solidFill>
-                <a:latin typeface="Calibri" pitchFamily="34" charset="0"/>
-              </a:defRPr>
-            </a:lvl5pPr>
-            <a:lvl6pPr marL="2514600" indent="-228600" eaLnBrk="0" fontAlgn="base" hangingPunct="0">
-              <a:spcBef>
-                <a:spcPct val="20000"/>
-              </a:spcBef>
-              <a:spcAft>
-                <a:spcPct val="0"/>
-              </a:spcAft>
-              <a:buFont typeface="Arial" charset="0"/>
-              <a:buChar char="»"/>
-              <a:defRPr sz="2000">
-                <a:solidFill>
-                  <a:schemeClr val="tx1"/>
-                </a:solidFill>
-                <a:latin typeface="Calibri" pitchFamily="34" charset="0"/>
-              </a:defRPr>
-            </a:lvl6pPr>
-            <a:lvl7pPr marL="2971800" indent="-228600" eaLnBrk="0" fontAlgn="base" hangingPunct="0">
-              <a:spcBef>
-                <a:spcPct val="20000"/>
-              </a:spcBef>
-              <a:spcAft>
-                <a:spcPct val="0"/>
-              </a:spcAft>
-              <a:buFont typeface="Arial" charset="0"/>
-              <a:buChar char="»"/>
-              <a:defRPr sz="2000">
-                <a:solidFill>
-                  <a:schemeClr val="tx1"/>
-                </a:solidFill>
-                <a:latin typeface="Calibri" pitchFamily="34" charset="0"/>
-              </a:defRPr>
-            </a:lvl7pPr>
-            <a:lvl8pPr marL="3429000" indent="-228600" eaLnBrk="0" fontAlgn="base" hangingPunct="0">
-              <a:spcBef>
-                <a:spcPct val="20000"/>
-              </a:spcBef>
-              <a:spcAft>
-                <a:spcPct val="0"/>
-              </a:spcAft>
-              <a:buFont typeface="Arial" charset="0"/>
-              <a:buChar char="»"/>
-              <a:defRPr sz="2000">
-                <a:solidFill>
-                  <a:schemeClr val="tx1"/>
-                </a:solidFill>
-                <a:latin typeface="Calibri" pitchFamily="34" charset="0"/>
-              </a:defRPr>
-            </a:lvl8pPr>
-            <a:lvl9pPr marL="3886200" indent="-228600" eaLnBrk="0" fontAlgn="base" hangingPunct="0">
-              <a:spcBef>
-                <a:spcPct val="20000"/>
-              </a:spcBef>
-              <a:spcAft>
-                <a:spcPct val="0"/>
-              </a:spcAft>
-              <a:buFont typeface="Arial" charset="0"/>
-              <a:buChar char="»"/>
-              <a:defRPr sz="2000">
-                <a:solidFill>
-                  <a:schemeClr val="tx1"/>
-                </a:solidFill>
-                <a:latin typeface="Calibri" pitchFamily="34" charset="0"/>
-              </a:defRPr>
-            </a:lvl9pPr>
-          </a:lstStyle>
-          <a:p>
-            <a:pPr eaLnBrk="1" hangingPunct="1">
-              <a:spcBef>
-                <a:spcPct val="0"/>
-              </a:spcBef>
-              <a:buFontTx/>
-              <a:buNone/>
-            </a:pPr>
-            <a:r>
-              <a:rPr lang="fr-FR" altLang="fr-FR" sz="1200" dirty="0" smtClean="0"/>
-              <a:t>(1,1)</a:t>
-            </a:r>
-            <a:endParaRPr lang="fr-FR" altLang="fr-FR" sz="1200" dirty="0"/>
-          </a:p>
-        </p:txBody>
-      </p:sp>
-      <p:sp>
-        <p:nvSpPr>
           <p:cNvPr id="170" name="TextBox 10"/>
           <p:cNvSpPr txBox="1">
             <a:spLocks noChangeArrowheads="1"/>
@@ -15063,77 +14375,13 @@
             </a:r>
             <a:r>
               <a:rPr lang="fr-FR" sz="1400" dirty="0" smtClean="0"/>
-              <a:t> : On considère que l’on peut créer une ligne sans qu’elle soit directement affiliée à un train, pareil pour les gares et les lignes, etc. D’où les (0,N)</a:t>
+              <a:t> : On considère que l’on peut créer une ligne sans qu’elle soit directement affiliée à un train, pareil pour les gares et les segments, etc. D’où les (0,N</a:t>
+            </a:r>
+            <a:r>
+              <a:rPr lang="fr-FR" sz="1400" dirty="0" smtClean="0"/>
+              <a:t>).</a:t>
             </a:r>
             <a:endParaRPr lang="fr-FR" sz="1400" dirty="0"/>
-          </a:p>
-        </p:txBody>
-      </p:sp>
-      <p:sp>
-        <p:nvSpPr>
-          <p:cNvPr id="176" name="Rectangle 175"/>
-          <p:cNvSpPr>
-            <a:spLocks noChangeAspect="1"/>
-          </p:cNvSpPr>
-          <p:nvPr/>
-        </p:nvSpPr>
-        <p:spPr>
-          <a:xfrm>
-            <a:off x="5126349" y="1061658"/>
-            <a:ext cx="1218181" cy="581917"/>
-          </a:xfrm>
-          <a:prstGeom prst="rect">
-            <a:avLst/>
-          </a:prstGeom>
-          <a:noFill/>
-          <a:ln w="25400">
-            <a:solidFill>
-              <a:schemeClr val="tx1"/>
-            </a:solidFill>
-          </a:ln>
-        </p:spPr>
-        <p:style>
-          <a:lnRef idx="2">
-            <a:schemeClr val="accent1">
-              <a:shade val="50000"/>
-            </a:schemeClr>
-          </a:lnRef>
-          <a:fillRef idx="1">
-            <a:schemeClr val="accent1"/>
-          </a:fillRef>
-          <a:effectRef idx="0">
-            <a:schemeClr val="accent1"/>
-          </a:effectRef>
-          <a:fontRef idx="minor">
-            <a:schemeClr val="lt1"/>
-          </a:fontRef>
-        </p:style>
-        <p:txBody>
-          <a:bodyPr wrap="none" lIns="0" tIns="0" rIns="0" bIns="0" anchor="ctr"/>
-          <a:lstStyle/>
-          <a:p>
-            <a:pPr algn="ctr" fontAlgn="auto">
-              <a:spcBef>
-                <a:spcPts val="0"/>
-              </a:spcBef>
-              <a:spcAft>
-                <a:spcPts val="0"/>
-              </a:spcAft>
-              <a:defRPr/>
-            </a:pPr>
-            <a:r>
-              <a:rPr lang="fr-FR" sz="1400" dirty="0" smtClean="0">
-                <a:solidFill>
-                  <a:schemeClr val="tx1"/>
-                </a:solidFill>
-              </a:rPr>
-              <a:t>Ligne</a:t>
-            </a:r>
-            <a:endParaRPr lang="fr-FR" sz="1400" dirty="0">
-              <a:solidFill>
-                <a:schemeClr val="tx1"/>
-              </a:solidFill>
-            </a:endParaRPr>
           </a:p>
         </p:txBody>
       </p:sp>
@@ -15216,8 +14464,8 @@
         </p:nvSpPr>
         <p:spPr>
           <a:xfrm>
-            <a:off x="3895728" y="2075144"/>
-            <a:ext cx="1079500" cy="539750"/>
+            <a:off x="5189888" y="1095673"/>
+            <a:ext cx="1212071" cy="580745"/>
           </a:xfrm>
           <a:prstGeom prst="flowChartDecision">
             <a:avLst/>
@@ -15274,41 +14522,6 @@
           </a:p>
         </p:txBody>
       </p:sp>
-      <p:cxnSp>
-        <p:nvCxnSpPr>
-          <p:cNvPr id="188" name="Straight Connector 12"/>
-          <p:cNvCxnSpPr/>
-          <p:nvPr/>
-        </p:nvCxnSpPr>
-        <p:spPr>
-          <a:xfrm>
-            <a:off x="4951990" y="1370062"/>
-            <a:ext cx="180000" cy="0"/>
-          </a:xfrm>
-          <a:prstGeom prst="line">
-            <a:avLst/>
-          </a:prstGeom>
-          <a:ln w="25400">
-            <a:solidFill>
-              <a:schemeClr val="tx1"/>
-            </a:solidFill>
-          </a:ln>
-        </p:spPr>
-        <p:style>
-          <a:lnRef idx="1">
-            <a:schemeClr val="accent1"/>
-          </a:lnRef>
-          <a:fillRef idx="0">
-            <a:schemeClr val="accent1"/>
-          </a:fillRef>
-          <a:effectRef idx="0">
-            <a:schemeClr val="accent1"/>
-          </a:effectRef>
-          <a:fontRef idx="minor">
-            <a:schemeClr val="tx1"/>
-          </a:fontRef>
-        </p:style>
-      </p:cxnSp>
       <p:sp>
         <p:nvSpPr>
           <p:cNvPr id="190" name="Flowchart: Decision 7"/>
@@ -15377,49 +14590,14 @@
       </p:sp>
       <p:cxnSp>
         <p:nvCxnSpPr>
-          <p:cNvPr id="191" name="Straight Connector 12"/>
-          <p:cNvCxnSpPr/>
-          <p:nvPr/>
-        </p:nvCxnSpPr>
-        <p:spPr>
-          <a:xfrm>
-            <a:off x="4123520" y="1367859"/>
-            <a:ext cx="180000" cy="0"/>
-          </a:xfrm>
-          <a:prstGeom prst="line">
-            <a:avLst/>
-          </a:prstGeom>
-          <a:ln w="25400">
-            <a:solidFill>
-              <a:schemeClr val="tx1"/>
-            </a:solidFill>
-          </a:ln>
-        </p:spPr>
-        <p:style>
-          <a:lnRef idx="1">
-            <a:schemeClr val="accent1"/>
-          </a:lnRef>
-          <a:fillRef idx="0">
-            <a:schemeClr val="accent1"/>
-          </a:fillRef>
-          <a:effectRef idx="0">
-            <a:schemeClr val="accent1"/>
-          </a:effectRef>
-          <a:fontRef idx="minor">
-            <a:schemeClr val="tx1"/>
-          </a:fontRef>
-        </p:style>
-      </p:cxnSp>
-      <p:cxnSp>
-        <p:nvCxnSpPr>
           <p:cNvPr id="192" name="Straight Connector 12"/>
           <p:cNvCxnSpPr/>
           <p:nvPr/>
         </p:nvCxnSpPr>
         <p:spPr>
           <a:xfrm>
-            <a:off x="2818313" y="1367293"/>
-            <a:ext cx="180000" cy="0"/>
+            <a:off x="4130046" y="1373169"/>
+            <a:ext cx="1080000" cy="0"/>
           </a:xfrm>
           <a:prstGeom prst="line">
             <a:avLst/>
@@ -15655,154 +14833,16 @@
       </p:cxnSp>
       <p:cxnSp>
         <p:nvCxnSpPr>
-          <p:cNvPr id="198" name="Straight Connector 12"/>
-          <p:cNvCxnSpPr/>
+          <p:cNvPr id="199" name="Straight Connector 32"/>
+          <p:cNvCxnSpPr>
+            <a:endCxn id="187" idx="2"/>
+          </p:cNvCxnSpPr>
           <p:nvPr/>
         </p:nvCxnSpPr>
         <p:spPr>
           <a:xfrm flipV="1">
-            <a:off x="4435477" y="2802995"/>
-            <a:ext cx="972000" cy="0"/>
-          </a:xfrm>
-          <a:prstGeom prst="line">
-            <a:avLst/>
-          </a:prstGeom>
-          <a:ln w="25400">
-            <a:solidFill>
-              <a:schemeClr val="tx1"/>
-            </a:solidFill>
-          </a:ln>
-        </p:spPr>
-        <p:style>
-          <a:lnRef idx="1">
-            <a:schemeClr val="accent1"/>
-          </a:lnRef>
-          <a:fillRef idx="0">
-            <a:schemeClr val="accent1"/>
-          </a:fillRef>
-          <a:effectRef idx="0">
-            <a:schemeClr val="accent1"/>
-          </a:effectRef>
-          <a:fontRef idx="minor">
-            <a:schemeClr val="tx1"/>
-          </a:fontRef>
-        </p:style>
-      </p:cxnSp>
-      <p:cxnSp>
-        <p:nvCxnSpPr>
-          <p:cNvPr id="199" name="Straight Connector 32"/>
-          <p:cNvCxnSpPr/>
-          <p:nvPr/>
-        </p:nvCxnSpPr>
-        <p:spPr>
-          <a:xfrm flipV="1">
-            <a:off x="5405992" y="2791781"/>
-            <a:ext cx="0" cy="265789"/>
-          </a:xfrm>
-          <a:prstGeom prst="line">
-            <a:avLst/>
-          </a:prstGeom>
-          <a:ln w="25400">
-            <a:solidFill>
-              <a:schemeClr val="tx1"/>
-            </a:solidFill>
-          </a:ln>
-        </p:spPr>
-        <p:style>
-          <a:lnRef idx="1">
-            <a:schemeClr val="accent1"/>
-          </a:lnRef>
-          <a:fillRef idx="0">
-            <a:schemeClr val="accent1"/>
-          </a:fillRef>
-          <a:effectRef idx="0">
-            <a:schemeClr val="accent1"/>
-          </a:effectRef>
-          <a:fontRef idx="minor">
-            <a:schemeClr val="tx1"/>
-          </a:fontRef>
-        </p:style>
-      </p:cxnSp>
-      <p:cxnSp>
-        <p:nvCxnSpPr>
-          <p:cNvPr id="200" name="Straight Connector 32"/>
-          <p:cNvCxnSpPr/>
-          <p:nvPr/>
-        </p:nvCxnSpPr>
-        <p:spPr>
-          <a:xfrm flipV="1">
-            <a:off x="4435478" y="2613581"/>
-            <a:ext cx="0" cy="198010"/>
-          </a:xfrm>
-          <a:prstGeom prst="line">
-            <a:avLst/>
-          </a:prstGeom>
-          <a:ln w="25400">
-            <a:solidFill>
-              <a:schemeClr val="tx1"/>
-            </a:solidFill>
-          </a:ln>
-        </p:spPr>
-        <p:style>
-          <a:lnRef idx="1">
-            <a:schemeClr val="accent1"/>
-          </a:lnRef>
-          <a:fillRef idx="0">
-            <a:schemeClr val="accent1"/>
-          </a:fillRef>
-          <a:effectRef idx="0">
-            <a:schemeClr val="accent1"/>
-          </a:effectRef>
-          <a:fontRef idx="minor">
-            <a:schemeClr val="tx1"/>
-          </a:fontRef>
-        </p:style>
-      </p:cxnSp>
-      <p:cxnSp>
-        <p:nvCxnSpPr>
-          <p:cNvPr id="201" name="Straight Connector 12"/>
-          <p:cNvCxnSpPr/>
-          <p:nvPr/>
-        </p:nvCxnSpPr>
-        <p:spPr>
-          <a:xfrm>
-            <a:off x="3561236" y="2345019"/>
-            <a:ext cx="365626" cy="0"/>
-          </a:xfrm>
-          <a:prstGeom prst="line">
-            <a:avLst/>
-          </a:prstGeom>
-          <a:ln w="25400">
-            <a:solidFill>
-              <a:schemeClr val="tx1"/>
-            </a:solidFill>
-          </a:ln>
-        </p:spPr>
-        <p:style>
-          <a:lnRef idx="1">
-            <a:schemeClr val="accent1"/>
-          </a:lnRef>
-          <a:fillRef idx="0">
-            <a:schemeClr val="accent1"/>
-          </a:fillRef>
-          <a:effectRef idx="0">
-            <a:schemeClr val="accent1"/>
-          </a:effectRef>
-          <a:fontRef idx="minor">
-            <a:schemeClr val="tx1"/>
-          </a:fontRef>
-        </p:style>
-      </p:cxnSp>
-      <p:cxnSp>
-        <p:nvCxnSpPr>
-          <p:cNvPr id="202" name="Straight Connector 32"/>
-          <p:cNvCxnSpPr/>
-          <p:nvPr/>
-        </p:nvCxnSpPr>
-        <p:spPr>
-          <a:xfrm flipV="1">
-            <a:off x="3565502" y="1722007"/>
-            <a:ext cx="0" cy="637200"/>
+            <a:off x="5782188" y="1676418"/>
+            <a:ext cx="13736" cy="1387078"/>
           </a:xfrm>
           <a:prstGeom prst="line">
             <a:avLst/>
@@ -15836,8 +14876,8 @@
         </p:nvSpPr>
         <p:spPr>
           <a:xfrm>
-            <a:off x="4574715" y="1904423"/>
-            <a:ext cx="655513" cy="201826"/>
+            <a:off x="5891767" y="832496"/>
+            <a:ext cx="735528" cy="260862"/>
           </a:xfrm>
           <a:prstGeom prst="ellipse">
             <a:avLst/>
@@ -15894,251 +14934,6 @@
           </a:p>
         </p:txBody>
       </p:sp>
-      <p:cxnSp>
-        <p:nvCxnSpPr>
-          <p:cNvPr id="205" name="Straight Connector 126"/>
-          <p:cNvCxnSpPr/>
-          <p:nvPr/>
-        </p:nvCxnSpPr>
-        <p:spPr>
-          <a:xfrm>
-            <a:off x="4475895" y="1094110"/>
-            <a:ext cx="119274" cy="113567"/>
-          </a:xfrm>
-          <a:prstGeom prst="line">
-            <a:avLst/>
-          </a:prstGeom>
-          <a:ln>
-            <a:solidFill>
-              <a:schemeClr val="tx1"/>
-            </a:solidFill>
-          </a:ln>
-        </p:spPr>
-        <p:style>
-          <a:lnRef idx="1">
-            <a:schemeClr val="accent1"/>
-          </a:lnRef>
-          <a:fillRef idx="0">
-            <a:schemeClr val="accent1"/>
-          </a:fillRef>
-          <a:effectRef idx="0">
-            <a:schemeClr val="accent1"/>
-          </a:effectRef>
-          <a:fontRef idx="minor">
-            <a:schemeClr val="tx1"/>
-          </a:fontRef>
-        </p:style>
-      </p:cxnSp>
-      <p:sp>
-        <p:nvSpPr>
-          <p:cNvPr id="206" name="Oval 62"/>
-          <p:cNvSpPr/>
-          <p:nvPr/>
-        </p:nvSpPr>
-        <p:spPr>
-          <a:xfrm>
-            <a:off x="4213520" y="892198"/>
-            <a:ext cx="655513" cy="201826"/>
-          </a:xfrm>
-          <a:prstGeom prst="ellipse">
-            <a:avLst/>
-          </a:prstGeom>
-          <a:noFill/>
-          <a:ln w="12700">
-            <a:solidFill>
-              <a:schemeClr val="tx1"/>
-            </a:solidFill>
-          </a:ln>
-        </p:spPr>
-        <p:style>
-          <a:lnRef idx="2">
-            <a:schemeClr val="accent1">
-              <a:shade val="50000"/>
-            </a:schemeClr>
-          </a:lnRef>
-          <a:fillRef idx="1">
-            <a:schemeClr val="accent1"/>
-          </a:fillRef>
-          <a:effectRef idx="0">
-            <a:schemeClr val="accent1"/>
-          </a:effectRef>
-          <a:fontRef idx="minor">
-            <a:schemeClr val="lt1"/>
-          </a:fontRef>
-        </p:style>
-        <p:txBody>
-          <a:bodyPr wrap="none" lIns="0" tIns="0" rIns="0" bIns="0" anchor="ctr"/>
-          <a:lstStyle/>
-          <a:p>
-            <a:pPr algn="ctr" fontAlgn="auto">
-              <a:spcBef>
-                <a:spcPts val="0"/>
-              </a:spcBef>
-              <a:spcAft>
-                <a:spcPts val="0"/>
-              </a:spcAft>
-              <a:defRPr/>
-            </a:pPr>
-            <a:r>
-              <a:rPr lang="fr-FR" sz="1000" dirty="0">
-                <a:solidFill>
-                  <a:schemeClr val="tx1"/>
-                </a:solidFill>
-              </a:rPr>
-              <a:t>r</a:t>
-            </a:r>
-            <a:r>
-              <a:rPr lang="fr-FR" sz="1000" dirty="0" smtClean="0">
-                <a:solidFill>
-                  <a:schemeClr val="tx1"/>
-                </a:solidFill>
-              </a:rPr>
-              <a:t>ang</a:t>
-            </a:r>
-            <a:endParaRPr lang="fr-FR" sz="1200" dirty="0">
-              <a:solidFill>
-                <a:schemeClr val="tx1"/>
-              </a:solidFill>
-            </a:endParaRPr>
-          </a:p>
-        </p:txBody>
-      </p:sp>
-      <p:cxnSp>
-        <p:nvCxnSpPr>
-          <p:cNvPr id="207" name="Straight Connector 126"/>
-          <p:cNvCxnSpPr/>
-          <p:nvPr/>
-        </p:nvCxnSpPr>
-        <p:spPr>
-          <a:xfrm flipH="1">
-            <a:off x="6003131" y="2134662"/>
-            <a:ext cx="195408" cy="94076"/>
-          </a:xfrm>
-          <a:prstGeom prst="line">
-            <a:avLst/>
-          </a:prstGeom>
-          <a:ln>
-            <a:solidFill>
-              <a:schemeClr val="tx1"/>
-            </a:solidFill>
-          </a:ln>
-        </p:spPr>
-        <p:style>
-          <a:lnRef idx="1">
-            <a:schemeClr val="accent1"/>
-          </a:lnRef>
-          <a:fillRef idx="0">
-            <a:schemeClr val="accent1"/>
-          </a:fillRef>
-          <a:effectRef idx="0">
-            <a:schemeClr val="accent1"/>
-          </a:effectRef>
-          <a:fontRef idx="minor">
-            <a:schemeClr val="tx1"/>
-          </a:fontRef>
-        </p:style>
-      </p:cxnSp>
-      <p:sp>
-        <p:nvSpPr>
-          <p:cNvPr id="208" name="Oval 62"/>
-          <p:cNvSpPr/>
-          <p:nvPr/>
-        </p:nvSpPr>
-        <p:spPr>
-          <a:xfrm>
-            <a:off x="5887359" y="1932836"/>
-            <a:ext cx="655513" cy="201826"/>
-          </a:xfrm>
-          <a:prstGeom prst="ellipse">
-            <a:avLst/>
-          </a:prstGeom>
-          <a:noFill/>
-          <a:ln w="12700">
-            <a:solidFill>
-              <a:schemeClr val="tx1"/>
-            </a:solidFill>
-          </a:ln>
-        </p:spPr>
-        <p:style>
-          <a:lnRef idx="2">
-            <a:schemeClr val="accent1">
-              <a:shade val="50000"/>
-            </a:schemeClr>
-          </a:lnRef>
-          <a:fillRef idx="1">
-            <a:schemeClr val="accent1"/>
-          </a:fillRef>
-          <a:effectRef idx="0">
-            <a:schemeClr val="accent1"/>
-          </a:effectRef>
-          <a:fontRef idx="minor">
-            <a:schemeClr val="lt1"/>
-          </a:fontRef>
-        </p:style>
-        <p:txBody>
-          <a:bodyPr wrap="none" lIns="0" tIns="0" rIns="0" bIns="0" anchor="ctr"/>
-          <a:lstStyle/>
-          <a:p>
-            <a:pPr algn="ctr" fontAlgn="auto">
-              <a:spcBef>
-                <a:spcPts val="0"/>
-              </a:spcBef>
-              <a:spcAft>
-                <a:spcPts val="0"/>
-              </a:spcAft>
-              <a:defRPr/>
-            </a:pPr>
-            <a:r>
-              <a:rPr lang="fr-FR" sz="1000" dirty="0" smtClean="0">
-                <a:solidFill>
-                  <a:schemeClr val="tx1"/>
-                </a:solidFill>
-              </a:rPr>
-              <a:t>sens</a:t>
-            </a:r>
-            <a:endParaRPr lang="fr-FR" sz="1200" dirty="0">
-              <a:solidFill>
-                <a:schemeClr val="tx1"/>
-              </a:solidFill>
-            </a:endParaRPr>
-          </a:p>
-        </p:txBody>
-      </p:sp>
-      <p:cxnSp>
-        <p:nvCxnSpPr>
-          <p:cNvPr id="211" name="Straight Connector 126"/>
-          <p:cNvCxnSpPr/>
-          <p:nvPr/>
-        </p:nvCxnSpPr>
-        <p:spPr>
-          <a:xfrm flipH="1">
-            <a:off x="5917176" y="827821"/>
-            <a:ext cx="264142" cy="224085"/>
-          </a:xfrm>
-          <a:prstGeom prst="line">
-            <a:avLst/>
-          </a:prstGeom>
-          <a:ln>
-            <a:solidFill>
-              <a:schemeClr val="tx1"/>
-            </a:solidFill>
-          </a:ln>
-        </p:spPr>
-        <p:style>
-          <a:lnRef idx="1">
-            <a:schemeClr val="accent1"/>
-          </a:lnRef>
-          <a:fillRef idx="0">
-            <a:schemeClr val="accent1"/>
-          </a:fillRef>
-          <a:effectRef idx="0">
-            <a:schemeClr val="accent1"/>
-          </a:effectRef>
-          <a:fontRef idx="minor">
-            <a:schemeClr val="tx1"/>
-          </a:fontRef>
-        </p:style>
-      </p:cxnSp>
       <p:sp>
         <p:nvSpPr>
           <p:cNvPr id="216" name="Oval 62"/>
@@ -16250,7 +15045,7 @@
         </p:nvSpPr>
         <p:spPr bwMode="auto">
           <a:xfrm>
-            <a:off x="4985542" y="2521646"/>
+            <a:off x="5196825" y="2704286"/>
             <a:ext cx="494046" cy="276999"/>
           </a:xfrm>
           <a:prstGeom prst="rect">
@@ -16428,579 +15223,6 @@
               <a:t>(1,N)</a:t>
             </a:r>
             <a:endParaRPr lang="fr-FR" altLang="fr-FR" sz="1200" dirty="0"/>
-          </a:p>
-        </p:txBody>
-      </p:sp>
-      <p:sp>
-        <p:nvSpPr>
-          <p:cNvPr id="221" name="TextBox 10"/>
-          <p:cNvSpPr txBox="1">
-            <a:spLocks noChangeArrowheads="1"/>
-          </p:cNvSpPr>
-          <p:nvPr/>
-        </p:nvSpPr>
-        <p:spPr bwMode="auto">
-          <a:xfrm>
-            <a:off x="3569769" y="1728432"/>
-            <a:ext cx="494046" cy="276999"/>
-          </a:xfrm>
-          <a:prstGeom prst="rect">
-            <a:avLst/>
-          </a:prstGeom>
-          <a:noFill/>
-          <a:ln>
-            <a:noFill/>
-          </a:ln>
-          <a:extLst>
-            <a:ext uri="{909E8E84-426E-40DD-AFC4-6F175D3DCCD1}">
-              <a14:hiddenFill xmlns:a14="http://schemas.microsoft.com/office/drawing/2010/main">
-                <a:solidFill>
-                  <a:srgbClr val="FFFFFF"/>
-                </a:solidFill>
-              </a14:hiddenFill>
-            </a:ext>
-            <a:ext uri="{91240B29-F687-4F45-9708-019B960494DF}">
-              <a14:hiddenLine xmlns:a14="http://schemas.microsoft.com/office/drawing/2010/main" w="9525">
-                <a:solidFill>
-                  <a:srgbClr val="000000"/>
-                </a:solidFill>
-                <a:miter lim="800000"/>
-                <a:headEnd/>
-                <a:tailEnd/>
-              </a14:hiddenLine>
-            </a:ext>
-          </a:extLst>
-        </p:spPr>
-        <p:txBody>
-          <a:bodyPr wrap="none">
-            <a:spAutoFit/>
-          </a:bodyPr>
-          <a:lstStyle>
-            <a:lvl1pPr eaLnBrk="0" hangingPunct="0">
-              <a:spcBef>
-                <a:spcPct val="20000"/>
-              </a:spcBef>
-              <a:buFont typeface="Arial" charset="0"/>
-              <a:buChar char="•"/>
-              <a:defRPr sz="3200">
-                <a:solidFill>
-                  <a:schemeClr val="tx1"/>
-                </a:solidFill>
-                <a:latin typeface="Calibri" pitchFamily="34" charset="0"/>
-              </a:defRPr>
-            </a:lvl1pPr>
-            <a:lvl2pPr marL="742950" indent="-285750" eaLnBrk="0" hangingPunct="0">
-              <a:spcBef>
-                <a:spcPct val="20000"/>
-              </a:spcBef>
-              <a:buFont typeface="Arial" charset="0"/>
-              <a:buChar char="–"/>
-              <a:defRPr sz="2800">
-                <a:solidFill>
-                  <a:schemeClr val="tx1"/>
-                </a:solidFill>
-                <a:latin typeface="Calibri" pitchFamily="34" charset="0"/>
-              </a:defRPr>
-            </a:lvl2pPr>
-            <a:lvl3pPr marL="1143000" indent="-228600" eaLnBrk="0" hangingPunct="0">
-              <a:spcBef>
-                <a:spcPct val="20000"/>
-              </a:spcBef>
-              <a:buFont typeface="Arial" charset="0"/>
-              <a:buChar char="•"/>
-              <a:defRPr sz="2400">
-                <a:solidFill>
-                  <a:schemeClr val="tx1"/>
-                </a:solidFill>
-                <a:latin typeface="Calibri" pitchFamily="34" charset="0"/>
-              </a:defRPr>
-            </a:lvl3pPr>
-            <a:lvl4pPr marL="1600200" indent="-228600" eaLnBrk="0" hangingPunct="0">
-              <a:spcBef>
-                <a:spcPct val="20000"/>
-              </a:spcBef>
-              <a:buFont typeface="Arial" charset="0"/>
-              <a:buChar char="–"/>
-              <a:defRPr sz="2000">
-                <a:solidFill>
-                  <a:schemeClr val="tx1"/>
-                </a:solidFill>
-                <a:latin typeface="Calibri" pitchFamily="34" charset="0"/>
-              </a:defRPr>
-            </a:lvl4pPr>
-            <a:lvl5pPr marL="2057400" indent="-228600" eaLnBrk="0" hangingPunct="0">
-              <a:spcBef>
-                <a:spcPct val="20000"/>
-              </a:spcBef>
-              <a:buFont typeface="Arial" charset="0"/>
-              <a:buChar char="»"/>
-              <a:defRPr sz="2000">
-                <a:solidFill>
-                  <a:schemeClr val="tx1"/>
-                </a:solidFill>
-                <a:latin typeface="Calibri" pitchFamily="34" charset="0"/>
-              </a:defRPr>
-            </a:lvl5pPr>
-            <a:lvl6pPr marL="2514600" indent="-228600" eaLnBrk="0" fontAlgn="base" hangingPunct="0">
-              <a:spcBef>
-                <a:spcPct val="20000"/>
-              </a:spcBef>
-              <a:spcAft>
-                <a:spcPct val="0"/>
-              </a:spcAft>
-              <a:buFont typeface="Arial" charset="0"/>
-              <a:buChar char="»"/>
-              <a:defRPr sz="2000">
-                <a:solidFill>
-                  <a:schemeClr val="tx1"/>
-                </a:solidFill>
-                <a:latin typeface="Calibri" pitchFamily="34" charset="0"/>
-              </a:defRPr>
-            </a:lvl6pPr>
-            <a:lvl7pPr marL="2971800" indent="-228600" eaLnBrk="0" fontAlgn="base" hangingPunct="0">
-              <a:spcBef>
-                <a:spcPct val="20000"/>
-              </a:spcBef>
-              <a:spcAft>
-                <a:spcPct val="0"/>
-              </a:spcAft>
-              <a:buFont typeface="Arial" charset="0"/>
-              <a:buChar char="»"/>
-              <a:defRPr sz="2000">
-                <a:solidFill>
-                  <a:schemeClr val="tx1"/>
-                </a:solidFill>
-                <a:latin typeface="Calibri" pitchFamily="34" charset="0"/>
-              </a:defRPr>
-            </a:lvl7pPr>
-            <a:lvl8pPr marL="3429000" indent="-228600" eaLnBrk="0" fontAlgn="base" hangingPunct="0">
-              <a:spcBef>
-                <a:spcPct val="20000"/>
-              </a:spcBef>
-              <a:spcAft>
-                <a:spcPct val="0"/>
-              </a:spcAft>
-              <a:buFont typeface="Arial" charset="0"/>
-              <a:buChar char="»"/>
-              <a:defRPr sz="2000">
-                <a:solidFill>
-                  <a:schemeClr val="tx1"/>
-                </a:solidFill>
-                <a:latin typeface="Calibri" pitchFamily="34" charset="0"/>
-              </a:defRPr>
-            </a:lvl8pPr>
-            <a:lvl9pPr marL="3886200" indent="-228600" eaLnBrk="0" fontAlgn="base" hangingPunct="0">
-              <a:spcBef>
-                <a:spcPct val="20000"/>
-              </a:spcBef>
-              <a:spcAft>
-                <a:spcPct val="0"/>
-              </a:spcAft>
-              <a:buFont typeface="Arial" charset="0"/>
-              <a:buChar char="»"/>
-              <a:defRPr sz="2000">
-                <a:solidFill>
-                  <a:schemeClr val="tx1"/>
-                </a:solidFill>
-                <a:latin typeface="Calibri" pitchFamily="34" charset="0"/>
-              </a:defRPr>
-            </a:lvl9pPr>
-          </a:lstStyle>
-          <a:p>
-            <a:pPr eaLnBrk="1" hangingPunct="1">
-              <a:spcBef>
-                <a:spcPct val="0"/>
-              </a:spcBef>
-              <a:buFontTx/>
-              <a:buNone/>
-            </a:pPr>
-            <a:r>
-              <a:rPr lang="fr-FR" altLang="fr-FR" sz="1200" dirty="0" smtClean="0"/>
-              <a:t>(0,N)</a:t>
-            </a:r>
-            <a:endParaRPr lang="fr-FR" altLang="fr-FR" sz="1200" dirty="0"/>
-          </a:p>
-        </p:txBody>
-      </p:sp>
-      <p:sp>
-        <p:nvSpPr>
-          <p:cNvPr id="222" name="TextBox 10"/>
-          <p:cNvSpPr txBox="1">
-            <a:spLocks noChangeArrowheads="1"/>
-          </p:cNvSpPr>
-          <p:nvPr/>
-        </p:nvSpPr>
-        <p:spPr bwMode="auto">
-          <a:xfrm>
-            <a:off x="4073040" y="1103839"/>
-            <a:ext cx="415498" cy="230832"/>
-          </a:xfrm>
-          <a:prstGeom prst="rect">
-            <a:avLst/>
-          </a:prstGeom>
-          <a:noFill/>
-          <a:ln>
-            <a:noFill/>
-          </a:ln>
-          <a:extLst>
-            <a:ext uri="{909E8E84-426E-40DD-AFC4-6F175D3DCCD1}">
-              <a14:hiddenFill xmlns:a14="http://schemas.microsoft.com/office/drawing/2010/main">
-                <a:solidFill>
-                  <a:srgbClr val="FFFFFF"/>
-                </a:solidFill>
-              </a14:hiddenFill>
-            </a:ext>
-            <a:ext uri="{91240B29-F687-4F45-9708-019B960494DF}">
-              <a14:hiddenLine xmlns:a14="http://schemas.microsoft.com/office/drawing/2010/main" w="9525">
-                <a:solidFill>
-                  <a:srgbClr val="000000"/>
-                </a:solidFill>
-                <a:miter lim="800000"/>
-                <a:headEnd/>
-                <a:tailEnd/>
-              </a14:hiddenLine>
-            </a:ext>
-          </a:extLst>
-        </p:spPr>
-        <p:txBody>
-          <a:bodyPr wrap="none">
-            <a:spAutoFit/>
-          </a:bodyPr>
-          <a:lstStyle>
-            <a:lvl1pPr eaLnBrk="0" hangingPunct="0">
-              <a:spcBef>
-                <a:spcPct val="20000"/>
-              </a:spcBef>
-              <a:buFont typeface="Arial" charset="0"/>
-              <a:buChar char="•"/>
-              <a:defRPr sz="3200">
-                <a:solidFill>
-                  <a:schemeClr val="tx1"/>
-                </a:solidFill>
-                <a:latin typeface="Calibri" pitchFamily="34" charset="0"/>
-              </a:defRPr>
-            </a:lvl1pPr>
-            <a:lvl2pPr marL="742950" indent="-285750" eaLnBrk="0" hangingPunct="0">
-              <a:spcBef>
-                <a:spcPct val="20000"/>
-              </a:spcBef>
-              <a:buFont typeface="Arial" charset="0"/>
-              <a:buChar char="–"/>
-              <a:defRPr sz="2800">
-                <a:solidFill>
-                  <a:schemeClr val="tx1"/>
-                </a:solidFill>
-                <a:latin typeface="Calibri" pitchFamily="34" charset="0"/>
-              </a:defRPr>
-            </a:lvl2pPr>
-            <a:lvl3pPr marL="1143000" indent="-228600" eaLnBrk="0" hangingPunct="0">
-              <a:spcBef>
-                <a:spcPct val="20000"/>
-              </a:spcBef>
-              <a:buFont typeface="Arial" charset="0"/>
-              <a:buChar char="•"/>
-              <a:defRPr sz="2400">
-                <a:solidFill>
-                  <a:schemeClr val="tx1"/>
-                </a:solidFill>
-                <a:latin typeface="Calibri" pitchFamily="34" charset="0"/>
-              </a:defRPr>
-            </a:lvl3pPr>
-            <a:lvl4pPr marL="1600200" indent="-228600" eaLnBrk="0" hangingPunct="0">
-              <a:spcBef>
-                <a:spcPct val="20000"/>
-              </a:spcBef>
-              <a:buFont typeface="Arial" charset="0"/>
-              <a:buChar char="–"/>
-              <a:defRPr sz="2000">
-                <a:solidFill>
-                  <a:schemeClr val="tx1"/>
-                </a:solidFill>
-                <a:latin typeface="Calibri" pitchFamily="34" charset="0"/>
-              </a:defRPr>
-            </a:lvl4pPr>
-            <a:lvl5pPr marL="2057400" indent="-228600" eaLnBrk="0" hangingPunct="0">
-              <a:spcBef>
-                <a:spcPct val="20000"/>
-              </a:spcBef>
-              <a:buFont typeface="Arial" charset="0"/>
-              <a:buChar char="»"/>
-              <a:defRPr sz="2000">
-                <a:solidFill>
-                  <a:schemeClr val="tx1"/>
-                </a:solidFill>
-                <a:latin typeface="Calibri" pitchFamily="34" charset="0"/>
-              </a:defRPr>
-            </a:lvl5pPr>
-            <a:lvl6pPr marL="2514600" indent="-228600" eaLnBrk="0" fontAlgn="base" hangingPunct="0">
-              <a:spcBef>
-                <a:spcPct val="20000"/>
-              </a:spcBef>
-              <a:spcAft>
-                <a:spcPct val="0"/>
-              </a:spcAft>
-              <a:buFont typeface="Arial" charset="0"/>
-              <a:buChar char="»"/>
-              <a:defRPr sz="2000">
-                <a:solidFill>
-                  <a:schemeClr val="tx1"/>
-                </a:solidFill>
-                <a:latin typeface="Calibri" pitchFamily="34" charset="0"/>
-              </a:defRPr>
-            </a:lvl6pPr>
-            <a:lvl7pPr marL="2971800" indent="-228600" eaLnBrk="0" fontAlgn="base" hangingPunct="0">
-              <a:spcBef>
-                <a:spcPct val="20000"/>
-              </a:spcBef>
-              <a:spcAft>
-                <a:spcPct val="0"/>
-              </a:spcAft>
-              <a:buFont typeface="Arial" charset="0"/>
-              <a:buChar char="»"/>
-              <a:defRPr sz="2000">
-                <a:solidFill>
-                  <a:schemeClr val="tx1"/>
-                </a:solidFill>
-                <a:latin typeface="Calibri" pitchFamily="34" charset="0"/>
-              </a:defRPr>
-            </a:lvl7pPr>
-            <a:lvl8pPr marL="3429000" indent="-228600" eaLnBrk="0" fontAlgn="base" hangingPunct="0">
-              <a:spcBef>
-                <a:spcPct val="20000"/>
-              </a:spcBef>
-              <a:spcAft>
-                <a:spcPct val="0"/>
-              </a:spcAft>
-              <a:buFont typeface="Arial" charset="0"/>
-              <a:buChar char="»"/>
-              <a:defRPr sz="2000">
-                <a:solidFill>
-                  <a:schemeClr val="tx1"/>
-                </a:solidFill>
-                <a:latin typeface="Calibri" pitchFamily="34" charset="0"/>
-              </a:defRPr>
-            </a:lvl8pPr>
-            <a:lvl9pPr marL="3886200" indent="-228600" eaLnBrk="0" fontAlgn="base" hangingPunct="0">
-              <a:spcBef>
-                <a:spcPct val="20000"/>
-              </a:spcBef>
-              <a:spcAft>
-                <a:spcPct val="0"/>
-              </a:spcAft>
-              <a:buFont typeface="Arial" charset="0"/>
-              <a:buChar char="»"/>
-              <a:defRPr sz="2000">
-                <a:solidFill>
-                  <a:schemeClr val="tx1"/>
-                </a:solidFill>
-                <a:latin typeface="Calibri" pitchFamily="34" charset="0"/>
-              </a:defRPr>
-            </a:lvl9pPr>
-          </a:lstStyle>
-          <a:p>
-            <a:pPr eaLnBrk="1" hangingPunct="1">
-              <a:spcBef>
-                <a:spcPct val="0"/>
-              </a:spcBef>
-              <a:buFontTx/>
-              <a:buNone/>
-            </a:pPr>
-            <a:r>
-              <a:rPr lang="fr-FR" altLang="fr-FR" sz="900" dirty="0" smtClean="0"/>
-              <a:t>(1,N)</a:t>
-            </a:r>
-            <a:endParaRPr lang="fr-FR" altLang="fr-FR" sz="900" dirty="0"/>
-          </a:p>
-        </p:txBody>
-      </p:sp>
-      <p:sp>
-        <p:nvSpPr>
-          <p:cNvPr id="223" name="TextBox 10"/>
-          <p:cNvSpPr txBox="1">
-            <a:spLocks noChangeArrowheads="1"/>
-          </p:cNvSpPr>
-          <p:nvPr/>
-        </p:nvSpPr>
-        <p:spPr bwMode="auto">
-          <a:xfrm>
-            <a:off x="4788278" y="1103839"/>
-            <a:ext cx="415498" cy="230832"/>
-          </a:xfrm>
-          <a:prstGeom prst="rect">
-            <a:avLst/>
-          </a:prstGeom>
-          <a:noFill/>
-          <a:ln>
-            <a:noFill/>
-          </a:ln>
-          <a:extLst>
-            <a:ext uri="{909E8E84-426E-40DD-AFC4-6F175D3DCCD1}">
-              <a14:hiddenFill xmlns:a14="http://schemas.microsoft.com/office/drawing/2010/main">
-                <a:solidFill>
-                  <a:srgbClr val="FFFFFF"/>
-                </a:solidFill>
-              </a14:hiddenFill>
-            </a:ext>
-            <a:ext uri="{91240B29-F687-4F45-9708-019B960494DF}">
-              <a14:hiddenLine xmlns:a14="http://schemas.microsoft.com/office/drawing/2010/main" w="9525">
-                <a:solidFill>
-                  <a:srgbClr val="000000"/>
-                </a:solidFill>
-                <a:miter lim="800000"/>
-                <a:headEnd/>
-                <a:tailEnd/>
-              </a14:hiddenLine>
-            </a:ext>
-          </a:extLst>
-        </p:spPr>
-        <p:txBody>
-          <a:bodyPr wrap="none">
-            <a:spAutoFit/>
-          </a:bodyPr>
-          <a:lstStyle>
-            <a:lvl1pPr eaLnBrk="0" hangingPunct="0">
-              <a:spcBef>
-                <a:spcPct val="20000"/>
-              </a:spcBef>
-              <a:buFont typeface="Arial" charset="0"/>
-              <a:buChar char="•"/>
-              <a:defRPr sz="3200">
-                <a:solidFill>
-                  <a:schemeClr val="tx1"/>
-                </a:solidFill>
-                <a:latin typeface="Calibri" pitchFamily="34" charset="0"/>
-              </a:defRPr>
-            </a:lvl1pPr>
-            <a:lvl2pPr marL="742950" indent="-285750" eaLnBrk="0" hangingPunct="0">
-              <a:spcBef>
-                <a:spcPct val="20000"/>
-              </a:spcBef>
-              <a:buFont typeface="Arial" charset="0"/>
-              <a:buChar char="–"/>
-              <a:defRPr sz="2800">
-                <a:solidFill>
-                  <a:schemeClr val="tx1"/>
-                </a:solidFill>
-                <a:latin typeface="Calibri" pitchFamily="34" charset="0"/>
-              </a:defRPr>
-            </a:lvl2pPr>
-            <a:lvl3pPr marL="1143000" indent="-228600" eaLnBrk="0" hangingPunct="0">
-              <a:spcBef>
-                <a:spcPct val="20000"/>
-              </a:spcBef>
-              <a:buFont typeface="Arial" charset="0"/>
-              <a:buChar char="•"/>
-              <a:defRPr sz="2400">
-                <a:solidFill>
-                  <a:schemeClr val="tx1"/>
-                </a:solidFill>
-                <a:latin typeface="Calibri" pitchFamily="34" charset="0"/>
-              </a:defRPr>
-            </a:lvl3pPr>
-            <a:lvl4pPr marL="1600200" indent="-228600" eaLnBrk="0" hangingPunct="0">
-              <a:spcBef>
-                <a:spcPct val="20000"/>
-              </a:spcBef>
-              <a:buFont typeface="Arial" charset="0"/>
-              <a:buChar char="–"/>
-              <a:defRPr sz="2000">
-                <a:solidFill>
-                  <a:schemeClr val="tx1"/>
-                </a:solidFill>
-                <a:latin typeface="Calibri" pitchFamily="34" charset="0"/>
-              </a:defRPr>
-            </a:lvl4pPr>
-            <a:lvl5pPr marL="2057400" indent="-228600" eaLnBrk="0" hangingPunct="0">
-              <a:spcBef>
-                <a:spcPct val="20000"/>
-              </a:spcBef>
-              <a:buFont typeface="Arial" charset="0"/>
-              <a:buChar char="»"/>
-              <a:defRPr sz="2000">
-                <a:solidFill>
-                  <a:schemeClr val="tx1"/>
-                </a:solidFill>
-                <a:latin typeface="Calibri" pitchFamily="34" charset="0"/>
-              </a:defRPr>
-            </a:lvl5pPr>
-            <a:lvl6pPr marL="2514600" indent="-228600" eaLnBrk="0" fontAlgn="base" hangingPunct="0">
-              <a:spcBef>
-                <a:spcPct val="20000"/>
-              </a:spcBef>
-              <a:spcAft>
-                <a:spcPct val="0"/>
-              </a:spcAft>
-              <a:buFont typeface="Arial" charset="0"/>
-              <a:buChar char="»"/>
-              <a:defRPr sz="2000">
-                <a:solidFill>
-                  <a:schemeClr val="tx1"/>
-                </a:solidFill>
-                <a:latin typeface="Calibri" pitchFamily="34" charset="0"/>
-              </a:defRPr>
-            </a:lvl6pPr>
-            <a:lvl7pPr marL="2971800" indent="-228600" eaLnBrk="0" fontAlgn="base" hangingPunct="0">
-              <a:spcBef>
-                <a:spcPct val="20000"/>
-              </a:spcBef>
-              <a:spcAft>
-                <a:spcPct val="0"/>
-              </a:spcAft>
-              <a:buFont typeface="Arial" charset="0"/>
-              <a:buChar char="»"/>
-              <a:defRPr sz="2000">
-                <a:solidFill>
-                  <a:schemeClr val="tx1"/>
-                </a:solidFill>
-                <a:latin typeface="Calibri" pitchFamily="34" charset="0"/>
-              </a:defRPr>
-            </a:lvl7pPr>
-            <a:lvl8pPr marL="3429000" indent="-228600" eaLnBrk="0" fontAlgn="base" hangingPunct="0">
-              <a:spcBef>
-                <a:spcPct val="20000"/>
-              </a:spcBef>
-              <a:spcAft>
-                <a:spcPct val="0"/>
-              </a:spcAft>
-              <a:buFont typeface="Arial" charset="0"/>
-              <a:buChar char="»"/>
-              <a:defRPr sz="2000">
-                <a:solidFill>
-                  <a:schemeClr val="tx1"/>
-                </a:solidFill>
-                <a:latin typeface="Calibri" pitchFamily="34" charset="0"/>
-              </a:defRPr>
-            </a:lvl8pPr>
-            <a:lvl9pPr marL="3886200" indent="-228600" eaLnBrk="0" fontAlgn="base" hangingPunct="0">
-              <a:spcBef>
-                <a:spcPct val="20000"/>
-              </a:spcBef>
-              <a:spcAft>
-                <a:spcPct val="0"/>
-              </a:spcAft>
-              <a:buFont typeface="Arial" charset="0"/>
-              <a:buChar char="»"/>
-              <a:defRPr sz="2000">
-                <a:solidFill>
-                  <a:schemeClr val="tx1"/>
-                </a:solidFill>
-                <a:latin typeface="Calibri" pitchFamily="34" charset="0"/>
-              </a:defRPr>
-            </a:lvl9pPr>
-          </a:lstStyle>
-          <a:p>
-            <a:pPr eaLnBrk="1" hangingPunct="1">
-              <a:spcBef>
-                <a:spcPct val="0"/>
-              </a:spcBef>
-              <a:buFontTx/>
-              <a:buNone/>
-            </a:pPr>
-            <a:r>
-              <a:rPr lang="fr-FR" altLang="fr-FR" sz="900" dirty="0" smtClean="0"/>
-              <a:t>(1,N)</a:t>
-            </a:r>
-            <a:endParaRPr lang="fr-FR" altLang="fr-FR" sz="900" dirty="0"/>
           </a:p>
         </p:txBody>
       </p:sp>
@@ -17577,10 +15799,388 @@
           </a:p>
         </p:txBody>
       </p:sp>
+      <p:cxnSp>
+        <p:nvCxnSpPr>
+          <p:cNvPr id="189" name="Straight Connector 126"/>
+          <p:cNvCxnSpPr/>
+          <p:nvPr/>
+        </p:nvCxnSpPr>
+        <p:spPr>
+          <a:xfrm>
+            <a:off x="5405342" y="1109289"/>
+            <a:ext cx="119274" cy="113567"/>
+          </a:xfrm>
+          <a:prstGeom prst="line">
+            <a:avLst/>
+          </a:prstGeom>
+          <a:ln>
+            <a:solidFill>
+              <a:schemeClr val="tx1"/>
+            </a:solidFill>
+          </a:ln>
+        </p:spPr>
+        <p:style>
+          <a:lnRef idx="1">
+            <a:schemeClr val="accent1"/>
+          </a:lnRef>
+          <a:fillRef idx="0">
+            <a:schemeClr val="accent1"/>
+          </a:fillRef>
+          <a:effectRef idx="0">
+            <a:schemeClr val="accent1"/>
+          </a:effectRef>
+          <a:fontRef idx="minor">
+            <a:schemeClr val="tx1"/>
+          </a:fontRef>
+        </p:style>
+      </p:cxnSp>
+      <p:sp>
+        <p:nvSpPr>
+          <p:cNvPr id="203" name="Oval 62"/>
+          <p:cNvSpPr/>
+          <p:nvPr/>
+        </p:nvSpPr>
+        <p:spPr>
+          <a:xfrm>
+            <a:off x="5002613" y="892843"/>
+            <a:ext cx="713619" cy="228248"/>
+          </a:xfrm>
+          <a:prstGeom prst="ellipse">
+            <a:avLst/>
+          </a:prstGeom>
+          <a:noFill/>
+          <a:ln w="12700">
+            <a:solidFill>
+              <a:schemeClr val="tx1"/>
+            </a:solidFill>
+          </a:ln>
+        </p:spPr>
+        <p:style>
+          <a:lnRef idx="2">
+            <a:schemeClr val="accent1">
+              <a:shade val="50000"/>
+            </a:schemeClr>
+          </a:lnRef>
+          <a:fillRef idx="1">
+            <a:schemeClr val="accent1"/>
+          </a:fillRef>
+          <a:effectRef idx="0">
+            <a:schemeClr val="accent1"/>
+          </a:effectRef>
+          <a:fontRef idx="minor">
+            <a:schemeClr val="lt1"/>
+          </a:fontRef>
+        </p:style>
+        <p:txBody>
+          <a:bodyPr wrap="none" lIns="0" tIns="0" rIns="0" bIns="0" anchor="ctr"/>
+          <a:lstStyle/>
+          <a:p>
+            <a:pPr algn="ctr" fontAlgn="auto">
+              <a:spcBef>
+                <a:spcPts val="0"/>
+              </a:spcBef>
+              <a:spcAft>
+                <a:spcPts val="0"/>
+              </a:spcAft>
+              <a:defRPr/>
+            </a:pPr>
+            <a:r>
+              <a:rPr lang="fr-FR" sz="1000" dirty="0">
+                <a:solidFill>
+                  <a:schemeClr val="tx1"/>
+                </a:solidFill>
+              </a:rPr>
+              <a:t>r</a:t>
+            </a:r>
+            <a:r>
+              <a:rPr lang="fr-FR" sz="1000" dirty="0" smtClean="0">
+                <a:solidFill>
+                  <a:schemeClr val="tx1"/>
+                </a:solidFill>
+              </a:rPr>
+              <a:t>ang</a:t>
+            </a:r>
+            <a:endParaRPr lang="fr-FR" sz="1200" dirty="0">
+              <a:solidFill>
+                <a:schemeClr val="tx1"/>
+              </a:solidFill>
+            </a:endParaRPr>
+          </a:p>
+        </p:txBody>
+      </p:sp>
+      <p:sp>
+        <p:nvSpPr>
+          <p:cNvPr id="209" name="TextBox 10"/>
+          <p:cNvSpPr txBox="1">
+            <a:spLocks noChangeArrowheads="1"/>
+          </p:cNvSpPr>
+          <p:nvPr/>
+        </p:nvSpPr>
+        <p:spPr bwMode="auto">
+          <a:xfrm>
+            <a:off x="4587358" y="1080220"/>
+            <a:ext cx="494046" cy="276999"/>
+          </a:xfrm>
+          <a:prstGeom prst="rect">
+            <a:avLst/>
+          </a:prstGeom>
+          <a:noFill/>
+          <a:ln>
+            <a:noFill/>
+          </a:ln>
+          <a:extLst>
+            <a:ext uri="{909E8E84-426E-40DD-AFC4-6F175D3DCCD1}">
+              <a14:hiddenFill xmlns:a14="http://schemas.microsoft.com/office/drawing/2010/main">
+                <a:solidFill>
+                  <a:srgbClr val="FFFFFF"/>
+                </a:solidFill>
+              </a14:hiddenFill>
+            </a:ext>
+            <a:ext uri="{91240B29-F687-4F45-9708-019B960494DF}">
+              <a14:hiddenLine xmlns:a14="http://schemas.microsoft.com/office/drawing/2010/main" w="9525">
+                <a:solidFill>
+                  <a:srgbClr val="000000"/>
+                </a:solidFill>
+                <a:miter lim="800000"/>
+                <a:headEnd/>
+                <a:tailEnd/>
+              </a14:hiddenLine>
+            </a:ext>
+          </a:extLst>
+        </p:spPr>
+        <p:txBody>
+          <a:bodyPr wrap="none">
+            <a:spAutoFit/>
+          </a:bodyPr>
+          <a:lstStyle>
+            <a:lvl1pPr eaLnBrk="0" hangingPunct="0">
+              <a:spcBef>
+                <a:spcPct val="20000"/>
+              </a:spcBef>
+              <a:buFont typeface="Arial" charset="0"/>
+              <a:buChar char="•"/>
+              <a:defRPr sz="3200">
+                <a:solidFill>
+                  <a:schemeClr val="tx1"/>
+                </a:solidFill>
+                <a:latin typeface="Calibri" pitchFamily="34" charset="0"/>
+              </a:defRPr>
+            </a:lvl1pPr>
+            <a:lvl2pPr marL="742950" indent="-285750" eaLnBrk="0" hangingPunct="0">
+              <a:spcBef>
+                <a:spcPct val="20000"/>
+              </a:spcBef>
+              <a:buFont typeface="Arial" charset="0"/>
+              <a:buChar char="–"/>
+              <a:defRPr sz="2800">
+                <a:solidFill>
+                  <a:schemeClr val="tx1"/>
+                </a:solidFill>
+                <a:latin typeface="Calibri" pitchFamily="34" charset="0"/>
+              </a:defRPr>
+            </a:lvl2pPr>
+            <a:lvl3pPr marL="1143000" indent="-228600" eaLnBrk="0" hangingPunct="0">
+              <a:spcBef>
+                <a:spcPct val="20000"/>
+              </a:spcBef>
+              <a:buFont typeface="Arial" charset="0"/>
+              <a:buChar char="•"/>
+              <a:defRPr sz="2400">
+                <a:solidFill>
+                  <a:schemeClr val="tx1"/>
+                </a:solidFill>
+                <a:latin typeface="Calibri" pitchFamily="34" charset="0"/>
+              </a:defRPr>
+            </a:lvl3pPr>
+            <a:lvl4pPr marL="1600200" indent="-228600" eaLnBrk="0" hangingPunct="0">
+              <a:spcBef>
+                <a:spcPct val="20000"/>
+              </a:spcBef>
+              <a:buFont typeface="Arial" charset="0"/>
+              <a:buChar char="–"/>
+              <a:defRPr sz="2000">
+                <a:solidFill>
+                  <a:schemeClr val="tx1"/>
+                </a:solidFill>
+                <a:latin typeface="Calibri" pitchFamily="34" charset="0"/>
+              </a:defRPr>
+            </a:lvl4pPr>
+            <a:lvl5pPr marL="2057400" indent="-228600" eaLnBrk="0" hangingPunct="0">
+              <a:spcBef>
+                <a:spcPct val="20000"/>
+              </a:spcBef>
+              <a:buFont typeface="Arial" charset="0"/>
+              <a:buChar char="»"/>
+              <a:defRPr sz="2000">
+                <a:solidFill>
+                  <a:schemeClr val="tx1"/>
+                </a:solidFill>
+                <a:latin typeface="Calibri" pitchFamily="34" charset="0"/>
+              </a:defRPr>
+            </a:lvl5pPr>
+            <a:lvl6pPr marL="2514600" indent="-228600" eaLnBrk="0" fontAlgn="base" hangingPunct="0">
+              <a:spcBef>
+                <a:spcPct val="20000"/>
+              </a:spcBef>
+              <a:spcAft>
+                <a:spcPct val="0"/>
+              </a:spcAft>
+              <a:buFont typeface="Arial" charset="0"/>
+              <a:buChar char="»"/>
+              <a:defRPr sz="2000">
+                <a:solidFill>
+                  <a:schemeClr val="tx1"/>
+                </a:solidFill>
+                <a:latin typeface="Calibri" pitchFamily="34" charset="0"/>
+              </a:defRPr>
+            </a:lvl6pPr>
+            <a:lvl7pPr marL="2971800" indent="-228600" eaLnBrk="0" fontAlgn="base" hangingPunct="0">
+              <a:spcBef>
+                <a:spcPct val="20000"/>
+              </a:spcBef>
+              <a:spcAft>
+                <a:spcPct val="0"/>
+              </a:spcAft>
+              <a:buFont typeface="Arial" charset="0"/>
+              <a:buChar char="»"/>
+              <a:defRPr sz="2000">
+                <a:solidFill>
+                  <a:schemeClr val="tx1"/>
+                </a:solidFill>
+                <a:latin typeface="Calibri" pitchFamily="34" charset="0"/>
+              </a:defRPr>
+            </a:lvl7pPr>
+            <a:lvl8pPr marL="3429000" indent="-228600" eaLnBrk="0" fontAlgn="base" hangingPunct="0">
+              <a:spcBef>
+                <a:spcPct val="20000"/>
+              </a:spcBef>
+              <a:spcAft>
+                <a:spcPct val="0"/>
+              </a:spcAft>
+              <a:buFont typeface="Arial" charset="0"/>
+              <a:buChar char="»"/>
+              <a:defRPr sz="2000">
+                <a:solidFill>
+                  <a:schemeClr val="tx1"/>
+                </a:solidFill>
+                <a:latin typeface="Calibri" pitchFamily="34" charset="0"/>
+              </a:defRPr>
+            </a:lvl8pPr>
+            <a:lvl9pPr marL="3886200" indent="-228600" eaLnBrk="0" fontAlgn="base" hangingPunct="0">
+              <a:spcBef>
+                <a:spcPct val="20000"/>
+              </a:spcBef>
+              <a:spcAft>
+                <a:spcPct val="0"/>
+              </a:spcAft>
+              <a:buFont typeface="Arial" charset="0"/>
+              <a:buChar char="»"/>
+              <a:defRPr sz="2000">
+                <a:solidFill>
+                  <a:schemeClr val="tx1"/>
+                </a:solidFill>
+                <a:latin typeface="Calibri" pitchFamily="34" charset="0"/>
+              </a:defRPr>
+            </a:lvl9pPr>
+          </a:lstStyle>
+          <a:p>
+            <a:pPr eaLnBrk="1" hangingPunct="1">
+              <a:spcBef>
+                <a:spcPct val="0"/>
+              </a:spcBef>
+              <a:buFontTx/>
+              <a:buNone/>
+            </a:pPr>
+            <a:r>
+              <a:rPr lang="fr-FR" altLang="fr-FR" sz="1200" dirty="0" smtClean="0"/>
+              <a:t>(0,N)</a:t>
+            </a:r>
+            <a:endParaRPr lang="fr-FR" altLang="fr-FR" sz="1200" dirty="0"/>
+          </a:p>
+        </p:txBody>
+      </p:sp>
+      <p:cxnSp>
+        <p:nvCxnSpPr>
+          <p:cNvPr id="210" name="Straight Connector 12"/>
+          <p:cNvCxnSpPr/>
+          <p:nvPr/>
+        </p:nvCxnSpPr>
+        <p:spPr>
+          <a:xfrm flipV="1">
+            <a:off x="2835999" y="1369168"/>
+            <a:ext cx="144000" cy="0"/>
+          </a:xfrm>
+          <a:prstGeom prst="line">
+            <a:avLst/>
+          </a:prstGeom>
+          <a:ln w="25400">
+            <a:solidFill>
+              <a:schemeClr val="tx1"/>
+            </a:solidFill>
+          </a:ln>
+        </p:spPr>
+        <p:style>
+          <a:lnRef idx="1">
+            <a:schemeClr val="accent1"/>
+          </a:lnRef>
+          <a:fillRef idx="0">
+            <a:schemeClr val="accent1"/>
+          </a:fillRef>
+          <a:effectRef idx="0">
+            <a:schemeClr val="accent1"/>
+          </a:effectRef>
+          <a:fontRef idx="minor">
+            <a:schemeClr val="tx1"/>
+          </a:fontRef>
+        </p:style>
+      </p:cxnSp>
+      <p:sp>
+        <p:nvSpPr>
+          <p:cNvPr id="164" name="ZoneTexte 163"/>
+          <p:cNvSpPr txBox="1"/>
+          <p:nvPr/>
+        </p:nvSpPr>
+        <p:spPr>
+          <a:xfrm>
+            <a:off x="7204013" y="2012306"/>
+            <a:ext cx="4864100" cy="738664"/>
+          </a:xfrm>
+          <a:prstGeom prst="rect">
+            <a:avLst/>
+          </a:prstGeom>
+          <a:noFill/>
+        </p:spPr>
+        <p:txBody>
+          <a:bodyPr wrap="square" rtlCol="0">
+            <a:spAutoFit/>
+          </a:bodyPr>
+          <a:lstStyle/>
+          <a:p>
+            <a:pPr algn="just"/>
+            <a:r>
+              <a:rPr lang="fr-FR" sz="1400" b="1" dirty="0" smtClean="0"/>
+              <a:t>Note</a:t>
+            </a:r>
+            <a:r>
+              <a:rPr lang="fr-FR" sz="1400" dirty="0" smtClean="0"/>
+              <a:t> : </a:t>
+            </a:r>
+            <a:r>
+              <a:rPr lang="fr-FR" sz="1400" dirty="0" smtClean="0"/>
+              <a:t>On garde les tables Train et Gare pour les contraintes de clés étrangères qu’elles représentent. (On ne peut pas manipuler n’importe quel numéro </a:t>
+            </a:r>
+            <a:r>
+              <a:rPr lang="fr-FR" sz="1400" smtClean="0"/>
+              <a:t>de Train / nom de Gare).</a:t>
+            </a:r>
+            <a:endParaRPr lang="fr-FR" sz="1400" dirty="0"/>
+          </a:p>
+        </p:txBody>
+      </p:sp>
     </p:spTree>
     <p:extLst>
       <p:ext uri="{BB962C8B-B14F-4D97-AF65-F5344CB8AC3E}">
-        <p14:creationId xmlns:p14="http://schemas.microsoft.com/office/powerpoint/2010/main" val="1840589395"/>
+        <p14:creationId xmlns:p14="http://schemas.microsoft.com/office/powerpoint/2010/main" val="1089447081"/>
       </p:ext>
     </p:extLst>
   </p:cSld>

</xml_diff>